<commit_message>
update app_ES & ES in ppt
</commit_message>
<xml_diff>
--- a/news_summary_t2.pptx
+++ b/news_summary_t2.pptx
@@ -16,6 +16,7 @@
     <p:sldId id="264" r:id="rId15"/>
     <p:sldId id="265" r:id="rId16"/>
     <p:sldId id="266" r:id="rId17"/>
+    <p:sldId id="267" r:id="rId18"/>
   </p:sldIdLst>
   <p:sldSz cx="9144000" cy="6858000" type="screen4x3"/>
   <p:notesSz cx="6858000" cy="9144000"/>
@@ -3177,114 +3178,266 @@
               <a:defRPr sz="4000"/>
             </a:pPr>
             <a:r>
-              <a:t>Selected Companies News</a:t>
-            </a:r>
-          </a:p>
-        </p:txBody>
-      </p:sp>
-      <p:sp>
-        <p:nvSpPr>
-          <p:cNvPr id="3" name="Content Placeholder 2"/>
-          <p:cNvSpPr>
-            <a:spLocks noGrp="1"/>
-          </p:cNvSpPr>
-          <p:nvPr>
-            <p:ph idx="1"/>
-          </p:nvPr>
-        </p:nvSpPr>
-        <p:spPr/>
-        <p:txBody>
-          <a:bodyPr/>
-          <a:lstStyle/>
-          <a:p>
-            <a:pPr>
-              <a:defRPr sz="1800" b="1"/>
-            </a:pPr>
-            <a:r>
-              <a:t>Does Elon Musk have a new enemy? Binance CEO Taunts Him Over Tesla Bitcoins</a:t>
-            </a:r>
-          </a:p>
-          <a:p>
-            <a:pPr lvl="1">
-              <a:defRPr sz="1200" i="1"/>
-            </a:pPr>
-            <a:r>
-              <a:t>1 weeks ago | Entrepreneur | NEGATIVE</a:t>
-            </a:r>
-          </a:p>
-          <a:p>
-            <a:pPr lvl="1">
-              <a:defRPr sz="1400"/>
-            </a:pPr>
-            <a:r>
-              <a:t>Elon Musk is embroiled in a new controversy and it seems that a new declared enemy has been named. Related: Apparently, Tesla Earns More With Bitcoin Than With the Sale of Its Own Cars</a:t>
-            </a:r>
-            <a:br/>
-            <a:br/>
-            <a:r>
-              <a:t>However, the CEO of SpaceX clarified that his company will not get rid of the cryptocurrencies it already owns.</a:t>
-            </a:r>
-          </a:p>
-          <a:p>
-            <a:pPr>
-              <a:defRPr b="1" sz="1800"/>
-            </a:pPr>
-            <a:r>
-              <a:t>Tesla CEO Elon Musk says the auto chip shortage is like the toilet paper frenzy last year, only worse (TSLA)</a:t>
-            </a:r>
-          </a:p>
-          <a:p>
-            <a:pPr lvl="1">
-              <a:defRPr sz="1200" i="1"/>
-            </a:pPr>
-            <a:r>
-              <a:t>1 weeks ago | Business Insider | NEGATIVE</a:t>
-            </a:r>
-          </a:p>
-          <a:p>
-            <a:pPr lvl="1">
-              <a:defRPr sz="1400"/>
-            </a:pPr>
-            <a:r>
-              <a:t>• Tesla CEO Elon Musk compared the chip shortage to the toilet paper buying frenzy in 2020. Last month, during the company's earnings call Musk said supply-chain issues were causing "insane difficulties" for the electric carmaker and the chip shortage had impacted Tesla's manufacturing goals.</a:t>
-            </a:r>
-          </a:p>
-          <a:p>
-            <a:pPr>
-              <a:defRPr b="1" sz="1800"/>
-            </a:pPr>
-            <a:r>
-              <a:t>Tesla's Higher Prices Due to Supply Chain Pressure, Says CEO Elon Musk</a:t>
-            </a:r>
-          </a:p>
-          <a:p>
-            <a:pPr lvl="1">
-              <a:defRPr sz="1200" i="1"/>
-            </a:pPr>
-            <a:r>
-              <a:t>1 weeks ago | Entrepreneur | NEGATIVE</a:t>
-            </a:r>
-          </a:p>
-          <a:p>
-            <a:pPr lvl="1">
-              <a:defRPr sz="1400"/>
-            </a:pPr>
-            <a:r>
-              <a:t>Opinions expressed by Entrepreneur contributors are their own. Musk was responding to an unverified Twitter account called @Ryanth3nerd who wrote:</a:t>
-            </a:r>
-            <a:br/>
-            <a:br/>
-            <a:r>
-              <a:t>“I really don’t like the direction @ is going raising prices of vehicles but removing features like lumbar for the Model Y...”</a:t>
-            </a:r>
-            <a:br/>
-            <a:br/>
-            <a:r>
-              <a:t>Tesla raised the price of its Model 3 and Model Y vehicles in May --- the fifth incremental increase in only a few months, according to the Electrek website.</a:t>
-            </a:r>
-          </a:p>
-        </p:txBody>
-      </p:sp>
+              <a:t>ESG: Top5 Society companies</a:t>
+            </a:r>
+          </a:p>
+        </p:txBody>
+      </p:sp>
+      <p:graphicFrame>
+        <p:nvGraphicFramePr>
+          <p:cNvPr id="3" name="Table 2"/>
+          <p:cNvGraphicFramePr>
+            <a:graphicFrameLocks noGrp="1"/>
+          </p:cNvGraphicFramePr>
+          <p:nvPr/>
+        </p:nvGraphicFramePr>
+        <p:xfrm>
+          <a:off x="914400" y="1828800"/>
+          <a:ext cx="7315200" cy="3657600"/>
+        </p:xfrm>
+        <a:graphic>
+          <a:graphicData uri="http://schemas.openxmlformats.org/drawingml/2006/table">
+            <a:tbl>
+              <a:tblPr firstRow="1" bandRow="1">
+                <a:tableStyleId>{5C22544A-7EE6-4342-B048-85BDC9FD1C3A}</a:tableStyleId>
+              </a:tblPr>
+              <a:tblGrid>
+                <a:gridCol w="2438400"/>
+                <a:gridCol w="2438400"/>
+                <a:gridCol w="2438400"/>
+              </a:tblGrid>
+              <a:tr h="609600">
+                <a:tc>
+                  <a:txBody>
+                    <a:bodyPr/>
+                    <a:lstStyle/>
+                    <a:p>
+                      <a:r>
+                        <a:t>company</a:t>
+                      </a:r>
+                    </a:p>
+                  </a:txBody>
+                  <a:tcPr/>
+                </a:tc>
+                <a:tc>
+                  <a:txBody>
+                    <a:bodyPr/>
+                    <a:lstStyle/>
+                    <a:p>
+                      <a:r>
+                        <a:t>total_news</a:t>
+                      </a:r>
+                    </a:p>
+                  </a:txBody>
+                  <a:tcPr/>
+                </a:tc>
+                <a:tc>
+                  <a:txBody>
+                    <a:bodyPr/>
+                    <a:lstStyle/>
+                    <a:p>
+                      <a:r>
+                        <a:t>score</a:t>
+                      </a:r>
+                    </a:p>
+                  </a:txBody>
+                  <a:tcPr/>
+                </a:tc>
+              </a:tr>
+              <a:tr h="609600">
+                <a:tc>
+                  <a:txBody>
+                    <a:bodyPr/>
+                    <a:lstStyle/>
+                    <a:p>
+                      <a:r>
+                        <a:t>Facebook</a:t>
+                      </a:r>
+                    </a:p>
+                  </a:txBody>
+                  <a:tcPr/>
+                </a:tc>
+                <a:tc>
+                  <a:txBody>
+                    <a:bodyPr/>
+                    <a:lstStyle/>
+                    <a:p>
+                      <a:r>
+                        <a:t>8</a:t>
+                      </a:r>
+                    </a:p>
+                  </a:txBody>
+                  <a:tcPr/>
+                </a:tc>
+                <a:tc>
+                  <a:txBody>
+                    <a:bodyPr/>
+                    <a:lstStyle/>
+                    <a:p>
+                      <a:r>
+                        <a:t>31.25</a:t>
+                      </a:r>
+                    </a:p>
+                  </a:txBody>
+                  <a:tcPr/>
+                </a:tc>
+              </a:tr>
+              <a:tr h="609600">
+                <a:tc>
+                  <a:txBody>
+                    <a:bodyPr/>
+                    <a:lstStyle/>
+                    <a:p>
+                      <a:r>
+                        <a:t>Netflix</a:t>
+                      </a:r>
+                    </a:p>
+                  </a:txBody>
+                  <a:tcPr/>
+                </a:tc>
+                <a:tc>
+                  <a:txBody>
+                    <a:bodyPr/>
+                    <a:lstStyle/>
+                    <a:p>
+                      <a:r>
+                        <a:t>7</a:t>
+                      </a:r>
+                    </a:p>
+                  </a:txBody>
+                  <a:tcPr/>
+                </a:tc>
+                <a:tc>
+                  <a:txBody>
+                    <a:bodyPr/>
+                    <a:lstStyle/>
+                    <a:p>
+                      <a:r>
+                        <a:t>57.14</a:t>
+                      </a:r>
+                    </a:p>
+                  </a:txBody>
+                  <a:tcPr/>
+                </a:tc>
+              </a:tr>
+              <a:tr h="609600">
+                <a:tc>
+                  <a:txBody>
+                    <a:bodyPr/>
+                    <a:lstStyle/>
+                    <a:p>
+                      <a:r>
+                        <a:t>Pfizer</a:t>
+                      </a:r>
+                    </a:p>
+                  </a:txBody>
+                  <a:tcPr/>
+                </a:tc>
+                <a:tc>
+                  <a:txBody>
+                    <a:bodyPr/>
+                    <a:lstStyle/>
+                    <a:p>
+                      <a:r>
+                        <a:t>4</a:t>
+                      </a:r>
+                    </a:p>
+                  </a:txBody>
+                  <a:tcPr/>
+                </a:tc>
+                <a:tc>
+                  <a:txBody>
+                    <a:bodyPr/>
+                    <a:lstStyle/>
+                    <a:p>
+                      <a:r>
+                        <a:t>50.0</a:t>
+                      </a:r>
+                    </a:p>
+                  </a:txBody>
+                  <a:tcPr/>
+                </a:tc>
+              </a:tr>
+              <a:tr h="609600">
+                <a:tc>
+                  <a:txBody>
+                    <a:bodyPr/>
+                    <a:lstStyle/>
+                    <a:p>
+                      <a:r>
+                        <a:t>AmerisourceBergen</a:t>
+                      </a:r>
+                    </a:p>
+                  </a:txBody>
+                  <a:tcPr/>
+                </a:tc>
+                <a:tc>
+                  <a:txBody>
+                    <a:bodyPr/>
+                    <a:lstStyle/>
+                    <a:p>
+                      <a:r>
+                        <a:t>2</a:t>
+                      </a:r>
+                    </a:p>
+                  </a:txBody>
+                  <a:tcPr/>
+                </a:tc>
+                <a:tc>
+                  <a:txBody>
+                    <a:bodyPr/>
+                    <a:lstStyle/>
+                    <a:p>
+                      <a:r>
+                        <a:t>0.0</a:t>
+                      </a:r>
+                    </a:p>
+                  </a:txBody>
+                  <a:tcPr/>
+                </a:tc>
+              </a:tr>
+              <a:tr h="609600">
+                <a:tc>
+                  <a:txBody>
+                    <a:bodyPr/>
+                    <a:lstStyle/>
+                    <a:p>
+                      <a:r>
+                        <a:t>Intel</a:t>
+                      </a:r>
+                    </a:p>
+                  </a:txBody>
+                  <a:tcPr/>
+                </a:tc>
+                <a:tc>
+                  <a:txBody>
+                    <a:bodyPr/>
+                    <a:lstStyle/>
+                    <a:p>
+                      <a:r>
+                        <a:t>2</a:t>
+                      </a:r>
+                    </a:p>
+                  </a:txBody>
+                  <a:tcPr/>
+                </a:tc>
+                <a:tc>
+                  <a:txBody>
+                    <a:bodyPr/>
+                    <a:lstStyle/>
+                    <a:p>
+                      <a:r>
+                        <a:t>25.0</a:t>
+                      </a:r>
+                    </a:p>
+                  </a:txBody>
+                  <a:tcPr/>
+                </a:tc>
+              </a:tr>
+            </a:tbl>
+          </a:graphicData>
+        </a:graphic>
+      </p:graphicFrame>
     </p:spTree>
   </p:cSld>
   <p:clrMapOvr>
@@ -3322,7 +3475,73 @@
               <a:defRPr sz="4000"/>
             </a:pPr>
             <a:r>
-              <a:t>Selected Companies News</a:t>
+              <a:t>Key words of the selected categories</a:t>
+            </a:r>
+          </a:p>
+        </p:txBody>
+      </p:sp>
+      <p:pic>
+        <p:nvPicPr>
+          <p:cNvPr id="3" name="Picture 2" descr="cat_wc_fig.png"/>
+          <p:cNvPicPr>
+            <a:picLocks noChangeAspect="1"/>
+          </p:cNvPicPr>
+          <p:nvPr/>
+        </p:nvPicPr>
+        <p:blipFill>
+          <a:blip r:embed="rId2"/>
+          <a:stretch>
+            <a:fillRect/>
+          </a:stretch>
+        </p:blipFill>
+        <p:spPr>
+          <a:xfrm>
+            <a:off x="667512" y="1097280"/>
+            <a:ext cx="7924800" cy="5943600"/>
+          </a:xfrm>
+          <a:prstGeom prst="rect">
+            <a:avLst/>
+          </a:prstGeom>
+        </p:spPr>
+      </p:pic>
+    </p:spTree>
+  </p:cSld>
+  <p:clrMapOvr>
+    <a:masterClrMapping/>
+  </p:clrMapOvr>
+</p:sld>
+</file>
+
+<file path=ppt/slides/slide12.xml><?xml version="1.0" encoding="utf-8"?>
+<p:sld xmlns:a="http://schemas.openxmlformats.org/drawingml/2006/main" xmlns:p="http://schemas.openxmlformats.org/presentationml/2006/main" xmlns:r="http://schemas.openxmlformats.org/officeDocument/2006/relationships">
+  <p:cSld>
+    <p:spTree>
+      <p:nvGrpSpPr>
+        <p:cNvPr id="1" name=""/>
+        <p:cNvGrpSpPr/>
+        <p:nvPr/>
+      </p:nvGrpSpPr>
+      <p:grpSpPr/>
+      <p:sp>
+        <p:nvSpPr>
+          <p:cNvPr id="2" name="Title 1"/>
+          <p:cNvSpPr>
+            <a:spLocks noGrp="1"/>
+          </p:cNvSpPr>
+          <p:nvPr>
+            <p:ph type="title"/>
+          </p:nvPr>
+        </p:nvSpPr>
+        <p:spPr/>
+        <p:txBody>
+          <a:bodyPr/>
+          <a:lstStyle/>
+          <a:p>
+            <a:pPr>
+              <a:defRPr sz="4000"/>
+            </a:pPr>
+            <a:r>
+              <a:t>Selected Categories News</a:t>
             </a:r>
           </a:p>
         </p:txBody>
@@ -3346,7 +3565,7 @@
               <a:defRPr sz="1800" b="1"/>
             </a:pPr>
             <a:r>
-              <a:t>: Tesla price increases caused by major issues sourcing critical parts, Elon Musk says</a:t>
+              <a:t>Sempra Energy To Hold Virtual Investor Day June 29</a:t>
             </a:r>
           </a:p>
           <a:p>
@@ -3354,7 +3573,7 @@
               <a:defRPr sz="1200" i="1"/>
             </a:pPr>
             <a:r>
-              <a:t>1 weeks ago | MarketWatch | NEGATIVE</a:t>
+              <a:t>5 days ago | PRNewswire | POSITIVE</a:t>
             </a:r>
           </a:p>
           <a:p>
@@ -3362,7 +3581,7 @@
               <a:defRPr sz="1400"/>
             </a:pPr>
             <a:r>
-              <a:t>Major issues sourcing key parts for the production of Tesla’s automobiles are behind recent increases to the cost of the electric vehicles, Chief Executive Elon Musk said on Twitter on Monday. Auto giants including Volkswagen VOW, 0P6N, and Ford F, have warned of a looming production crisis in recent quarterly earnings, with Ford projecting a $2.5 billion hit to profits this year from the chip shortage.</a:t>
+              <a:t>SAN DIEGO, June 9, 2021 /PRNewswire/ -- 's (NYSE: SRE) senior management team will provide an update on the company's business strategy, operational highlights and financial outlook at its virtual Investor Day event at 12 p.m. ET, June 29. Investors, analysts, media and the public may listen to a live webcast of the conference call on the company's website, sempra.com, by clicking on the appropriate audio link.</a:t>
             </a:r>
           </a:p>
           <a:p>
@@ -3370,7 +3589,7 @@
               <a:defRPr b="1" sz="1800"/>
             </a:pPr>
             <a:r>
-              <a:t>Elon Musk says Tesla prices are increasing because of supply chain disruptions across the auto industry</a:t>
+              <a:t>CMS Energy Announces the Strategic Sale of EnerBank USA to Regions Bank for $960 Million</a:t>
             </a:r>
           </a:p>
           <a:p>
@@ -3378,7 +3597,7 @@
               <a:defRPr sz="1200" i="1"/>
             </a:pPr>
             <a:r>
-              <a:t>1 weeks ago | Business Insider | NEGATIVE</a:t>
+              <a:t>6 days ago | Yahoo Entertainment | POSITIVE</a:t>
             </a:r>
           </a:p>
           <a:p>
@@ -3386,35 +3605,12 @@
               <a:defRPr sz="1400"/>
             </a:pPr>
             <a:r>
-              <a:t>• The prices of some Tesla models are going up because of the supply chain issues, CEO Elon Musk said. • Tesla earlier this month boosted prices on its Model 3 and Model Y.</a:t>
+              <a:t>- Funds key initiatives in core utility businesses (including clean energy transformation) and eliminates equity issuance needs from 2022 to 2024</a:t>
             </a:r>
             <a:br/>
-            <a:r>
-              <a:t>• The global auto industry has been hit hard by supply chain issues, notably a shortage of computer chips.</a:t>
-            </a:r>
-          </a:p>
-          <a:p>
-            <a:pPr>
-              <a:defRPr b="1" sz="1800"/>
-            </a:pPr>
-            <a:r>
-              <a:t>Elon Musk says Bitcoin no longer accepted for Tesla purchases</a:t>
-            </a:r>
-          </a:p>
-          <a:p>
-            <a:pPr lvl="1">
-              <a:defRPr sz="1200" i="1"/>
-            </a:pPr>
-            <a:r>
-              <a:t>1 months ago | Mashable | NEGATIVE</a:t>
-            </a:r>
-          </a:p>
-          <a:p>
-            <a:pPr lvl="1">
-              <a:defRPr sz="1400"/>
-            </a:pPr>
-            <a:r>
-              <a:t>Tesla CEO Elon Musk has changed his stance on cryptocurrency. Musk tweeted that the cryptocurrency's "great cost to the environment" meant Tesla won't be offering the payment option for its zero-emissions vehicles.</a:t>
+            <a:br/>
+            <a:r>
+              <a:t>JACKSON, Mich., June 8, 2021 /PRNewswire/ -- CMS Energy (NYSE: CMS) ("CMS") today announced that it has executed a definitive agreement to sell its wholly-owned subsidiary, EnerBank USA, to Regions Bank, a subsidiary of Regions Financial Corporation (NYSE: RF) ("Regions") for cash in a transaction valued at $960 million. Because the company is not able to estimate the impact of specific line items, which have the potential to significantly impact, favorably or unfavorably, the company's reported earnings per share in future periods, the company is not providing reported earnings per share guidance nor is it providing a reconciliation for the comparable future period earnings per share.</a:t>
             </a:r>
           </a:p>
         </p:txBody>
@@ -3554,7 +3750,7 @@
               <a:defRPr sz="1200" i="1"/>
             </a:pPr>
             <a:r>
-              <a:t>3 days ago | Yahoo Entertainment | POSITIVE</a:t>
+              <a:t>4 days ago | Yahoo Entertainment | POSITIVE</a:t>
             </a:r>
           </a:p>
           <a:p>
@@ -3578,7 +3774,7 @@
               <a:defRPr sz="1200" i="1"/>
             </a:pPr>
             <a:r>
-              <a:t>3 days ago | Reuters | NEGATIVE</a:t>
+              <a:t>4 days ago | Reuters | NEGATIVE</a:t>
             </a:r>
           </a:p>
           <a:p>
@@ -3602,7 +3798,7 @@
               <a:defRPr sz="1200" i="1"/>
             </a:pPr>
             <a:r>
-              <a:t>3 days ago | Business Wire | NEUTRAL</a:t>
+              <a:t>4 days ago | Business Wire | NEUTRAL</a:t>
             </a:r>
           </a:p>
           <a:p>
@@ -3684,7 +3880,7 @@
               <a:defRPr sz="1200" i="1"/>
             </a:pPr>
             <a:r>
-              <a:t>3 days ago | TechRadar | NEUTRAL</a:t>
+              <a:t>4 days ago | TechRadar | NEUTRAL</a:t>
             </a:r>
           </a:p>
           <a:p>
@@ -3708,7 +3904,7 @@
               <a:defRPr sz="1200" i="1"/>
             </a:pPr>
             <a:r>
-              <a:t>3 days ago | Yahoo Entertainment | NEGATIVE</a:t>
+              <a:t>4 days ago | Yahoo Entertainment | NEGATIVE</a:t>
             </a:r>
           </a:p>
           <a:p>
@@ -3732,7 +3928,7 @@
               <a:defRPr sz="1200" i="1"/>
             </a:pPr>
             <a:r>
-              <a:t>3 days ago | Netflixtechblog.com | NEUTRAL</a:t>
+              <a:t>4 days ago | Netflixtechblog.com | NEUTRAL</a:t>
             </a:r>
           </a:p>
           <a:p>
@@ -4018,14 +4214,14 @@
               <a:defRPr sz="4000"/>
             </a:pPr>
             <a:r>
-              <a:t>Key words of the selected categories</a:t>
+              <a:t>ESG Analysis -- Environment</a:t>
             </a:r>
           </a:p>
         </p:txBody>
       </p:sp>
       <p:pic>
         <p:nvPicPr>
-          <p:cNvPr id="3" name="Picture 2" descr="cat_wc_fig.png"/>
+          <p:cNvPr id="3" name="Picture 2" descr="environment_boxplot.png"/>
           <p:cNvPicPr>
             <a:picLocks noChangeAspect="1"/>
           </p:cNvPicPr>
@@ -4039,8 +4235,8 @@
         </p:blipFill>
         <p:spPr>
           <a:xfrm>
-            <a:off x="667512" y="1097280"/>
-            <a:ext cx="7924800" cy="5943600"/>
+            <a:off x="1143000" y="1371600"/>
+            <a:ext cx="6705600" cy="5029200"/>
           </a:xfrm>
           <a:prstGeom prst="rect">
             <a:avLst/>
@@ -4084,75 +4280,266 @@
               <a:defRPr sz="4000"/>
             </a:pPr>
             <a:r>
-              <a:t>Selected Categories News</a:t>
-            </a:r>
-          </a:p>
-        </p:txBody>
-      </p:sp>
-      <p:sp>
-        <p:nvSpPr>
-          <p:cNvPr id="3" name="Content Placeholder 2"/>
-          <p:cNvSpPr>
-            <a:spLocks noGrp="1"/>
-          </p:cNvSpPr>
-          <p:nvPr>
-            <p:ph idx="1"/>
-          </p:nvPr>
-        </p:nvSpPr>
-        <p:spPr/>
-        <p:txBody>
-          <a:bodyPr/>
-          <a:lstStyle/>
-          <a:p>
-            <a:pPr>
-              <a:defRPr sz="1800" b="1"/>
-            </a:pPr>
-            <a:r>
-              <a:t>Cabot Oil &amp; Gas Stock Is Estimated To Be Modestly Undervalued</a:t>
-            </a:r>
-          </a:p>
-          <a:p>
-            <a:pPr lvl="1">
-              <a:defRPr sz="1200" i="1"/>
-            </a:pPr>
-            <a:r>
-              <a:t>5 days ago | Yahoo Entertainment | NEUTRAL</a:t>
-            </a:r>
-          </a:p>
-          <a:p>
-            <a:pPr lvl="1">
-              <a:defRPr sz="1400"/>
-            </a:pPr>
-            <a:r>
-              <a:t>The stock of Cabot Oil &amp; Gas (NYSE:COG, 30-year Financials) shows every sign of being modestly undervalued, according to GuruFocus Value calculation.</a:t>
-            </a:r>
-          </a:p>
-          <a:p>
-            <a:pPr>
-              <a:defRPr b="1" sz="1800"/>
-            </a:pPr>
-            <a:r>
-              <a:t>Exxon Mobil Stock Is Estimated To Be Modestly Overvalued</a:t>
-            </a:r>
-          </a:p>
-          <a:p>
-            <a:pPr lvl="1">
-              <a:defRPr sz="1200" i="1"/>
-            </a:pPr>
-            <a:r>
-              <a:t>6 days ago | Yahoo Entertainment | NEGATIVE</a:t>
-            </a:r>
-          </a:p>
-          <a:p>
-            <a:pPr lvl="1">
-              <a:defRPr sz="1400"/>
-            </a:pPr>
-            <a:r>
-              <a:t>The stock of Exxon Mobil (NYSE:XOM, 30-year Financials) appears to be modestly overvalued, according to GuruFocus Value calculation.</a:t>
-            </a:r>
-          </a:p>
-        </p:txBody>
-      </p:sp>
+              <a:t>ESG: Top5 Environment companies</a:t>
+            </a:r>
+          </a:p>
+        </p:txBody>
+      </p:sp>
+      <p:graphicFrame>
+        <p:nvGraphicFramePr>
+          <p:cNvPr id="3" name="Table 2"/>
+          <p:cNvGraphicFramePr>
+            <a:graphicFrameLocks noGrp="1"/>
+          </p:cNvGraphicFramePr>
+          <p:nvPr/>
+        </p:nvGraphicFramePr>
+        <p:xfrm>
+          <a:off x="914400" y="1828800"/>
+          <a:ext cx="7315200" cy="3657600"/>
+        </p:xfrm>
+        <a:graphic>
+          <a:graphicData uri="http://schemas.openxmlformats.org/drawingml/2006/table">
+            <a:tbl>
+              <a:tblPr firstRow="1" bandRow="1">
+                <a:tableStyleId>{5C22544A-7EE6-4342-B048-85BDC9FD1C3A}</a:tableStyleId>
+              </a:tblPr>
+              <a:tblGrid>
+                <a:gridCol w="2438400"/>
+                <a:gridCol w="2438400"/>
+                <a:gridCol w="2438400"/>
+              </a:tblGrid>
+              <a:tr h="609600">
+                <a:tc>
+                  <a:txBody>
+                    <a:bodyPr/>
+                    <a:lstStyle/>
+                    <a:p>
+                      <a:r>
+                        <a:t>company</a:t>
+                      </a:r>
+                    </a:p>
+                  </a:txBody>
+                  <a:tcPr/>
+                </a:tc>
+                <a:tc>
+                  <a:txBody>
+                    <a:bodyPr/>
+                    <a:lstStyle/>
+                    <a:p>
+                      <a:r>
+                        <a:t>total_news</a:t>
+                      </a:r>
+                    </a:p>
+                  </a:txBody>
+                  <a:tcPr/>
+                </a:tc>
+                <a:tc>
+                  <a:txBody>
+                    <a:bodyPr/>
+                    <a:lstStyle/>
+                    <a:p>
+                      <a:r>
+                        <a:t>score</a:t>
+                      </a:r>
+                    </a:p>
+                  </a:txBody>
+                  <a:tcPr/>
+                </a:tc>
+              </a:tr>
+              <a:tr h="609600">
+                <a:tc>
+                  <a:txBody>
+                    <a:bodyPr/>
+                    <a:lstStyle/>
+                    <a:p>
+                      <a:r>
+                        <a:t>Tesla</a:t>
+                      </a:r>
+                    </a:p>
+                  </a:txBody>
+                  <a:tcPr/>
+                </a:tc>
+                <a:tc>
+                  <a:txBody>
+                    <a:bodyPr/>
+                    <a:lstStyle/>
+                    <a:p>
+                      <a:r>
+                        <a:t>18</a:t>
+                      </a:r>
+                    </a:p>
+                  </a:txBody>
+                  <a:tcPr/>
+                </a:tc>
+                <a:tc>
+                  <a:txBody>
+                    <a:bodyPr/>
+                    <a:lstStyle/>
+                    <a:p>
+                      <a:r>
+                        <a:t>36.11</a:t>
+                      </a:r>
+                    </a:p>
+                  </a:txBody>
+                  <a:tcPr/>
+                </a:tc>
+              </a:tr>
+              <a:tr h="609600">
+                <a:tc>
+                  <a:txBody>
+                    <a:bodyPr/>
+                    <a:lstStyle/>
+                    <a:p>
+                      <a:r>
+                        <a:t>Exxon Mobil</a:t>
+                      </a:r>
+                    </a:p>
+                  </a:txBody>
+                  <a:tcPr/>
+                </a:tc>
+                <a:tc>
+                  <a:txBody>
+                    <a:bodyPr/>
+                    <a:lstStyle/>
+                    <a:p>
+                      <a:r>
+                        <a:t>6</a:t>
+                      </a:r>
+                    </a:p>
+                  </a:txBody>
+                  <a:tcPr/>
+                </a:tc>
+                <a:tc>
+                  <a:txBody>
+                    <a:bodyPr/>
+                    <a:lstStyle/>
+                    <a:p>
+                      <a:r>
+                        <a:t>33.33</a:t>
+                      </a:r>
+                    </a:p>
+                  </a:txBody>
+                  <a:tcPr/>
+                </a:tc>
+              </a:tr>
+              <a:tr h="609600">
+                <a:tc>
+                  <a:txBody>
+                    <a:bodyPr/>
+                    <a:lstStyle/>
+                    <a:p>
+                      <a:r>
+                        <a:t>General Motors</a:t>
+                      </a:r>
+                    </a:p>
+                  </a:txBody>
+                  <a:tcPr/>
+                </a:tc>
+                <a:tc>
+                  <a:txBody>
+                    <a:bodyPr/>
+                    <a:lstStyle/>
+                    <a:p>
+                      <a:r>
+                        <a:t>5</a:t>
+                      </a:r>
+                    </a:p>
+                  </a:txBody>
+                  <a:tcPr/>
+                </a:tc>
+                <a:tc>
+                  <a:txBody>
+                    <a:bodyPr/>
+                    <a:lstStyle/>
+                    <a:p>
+                      <a:r>
+                        <a:t>50.0</a:t>
+                      </a:r>
+                    </a:p>
+                  </a:txBody>
+                  <a:tcPr/>
+                </a:tc>
+              </a:tr>
+              <a:tr h="609600">
+                <a:tc>
+                  <a:txBody>
+                    <a:bodyPr/>
+                    <a:lstStyle/>
+                    <a:p>
+                      <a:r>
+                        <a:t>Netflix</a:t>
+                      </a:r>
+                    </a:p>
+                  </a:txBody>
+                  <a:tcPr/>
+                </a:tc>
+                <a:tc>
+                  <a:txBody>
+                    <a:bodyPr/>
+                    <a:lstStyle/>
+                    <a:p>
+                      <a:r>
+                        <a:t>5</a:t>
+                      </a:r>
+                    </a:p>
+                  </a:txBody>
+                  <a:tcPr/>
+                </a:tc>
+                <a:tc>
+                  <a:txBody>
+                    <a:bodyPr/>
+                    <a:lstStyle/>
+                    <a:p>
+                      <a:r>
+                        <a:t>50.0</a:t>
+                      </a:r>
+                    </a:p>
+                  </a:txBody>
+                  <a:tcPr/>
+                </a:tc>
+              </a:tr>
+              <a:tr h="609600">
+                <a:tc>
+                  <a:txBody>
+                    <a:bodyPr/>
+                    <a:lstStyle/>
+                    <a:p>
+                      <a:r>
+                        <a:t>Microsoft</a:t>
+                      </a:r>
+                    </a:p>
+                  </a:txBody>
+                  <a:tcPr/>
+                </a:tc>
+                <a:tc>
+                  <a:txBody>
+                    <a:bodyPr/>
+                    <a:lstStyle/>
+                    <a:p>
+                      <a:r>
+                        <a:t>3</a:t>
+                      </a:r>
+                    </a:p>
+                  </a:txBody>
+                  <a:tcPr/>
+                </a:tc>
+                <a:tc>
+                  <a:txBody>
+                    <a:bodyPr/>
+                    <a:lstStyle/>
+                    <a:p>
+                      <a:r>
+                        <a:t>66.67</a:t>
+                      </a:r>
+                    </a:p>
+                  </a:txBody>
+                  <a:tcPr/>
+                </a:tc>
+              </a:tr>
+            </a:tbl>
+          </a:graphicData>
+        </a:graphic>
+      </p:graphicFrame>
     </p:spTree>
   </p:cSld>
   <p:clrMapOvr>
@@ -4190,14 +4577,14 @@
               <a:defRPr sz="4000"/>
             </a:pPr>
             <a:r>
-              <a:t>Key words of the selected companies</a:t>
+              <a:t>ESG Analysis -- Environment</a:t>
             </a:r>
           </a:p>
         </p:txBody>
       </p:sp>
       <p:pic>
         <p:nvPicPr>
-          <p:cNvPr id="3" name="Picture 2" descr="company_wc_fig.png"/>
+          <p:cNvPr id="3" name="Picture 2" descr="society_boxplot.png"/>
           <p:cNvPicPr>
             <a:picLocks noChangeAspect="1"/>
           </p:cNvPicPr>
@@ -4211,8 +4598,8 @@
         </p:blipFill>
         <p:spPr>
           <a:xfrm>
-            <a:off x="667512" y="1097280"/>
-            <a:ext cx="7924800" cy="5943600"/>
+            <a:off x="1143000" y="1371600"/>
+            <a:ext cx="6705600" cy="5029200"/>
           </a:xfrm>
           <a:prstGeom prst="rect">
             <a:avLst/>

</xml_diff>